<commit_message>
Added : video Youtube
</commit_message>
<xml_diff>
--- a/POO/POO.pptx
+++ b/POO/POO.pptx
@@ -1835,6 +1835,281 @@
 </p:notes>
 </file>
 
+<file path=ppt/notesSlides/notesSlide3.xml><?xml version="1.0" encoding="utf-8"?>
+<p:notes xmlns:a="http://schemas.openxmlformats.org/drawingml/2006/main" xmlns:r="http://schemas.openxmlformats.org/officeDocument/2006/relationships" xmlns:p="http://schemas.openxmlformats.org/presentationml/2006/main">
+  <p:cSld>
+    <p:spTree>
+      <p:nvGrpSpPr>
+        <p:cNvPr id="1" name=""/>
+        <p:cNvGrpSpPr/>
+        <p:nvPr/>
+      </p:nvGrpSpPr>
+      <p:grpSpPr>
+        <a:xfrm>
+          <a:off x="0" y="0"/>
+          <a:ext cx="0" cy="0"/>
+          <a:chOff x="0" y="0"/>
+          <a:chExt cx="0" cy="0"/>
+        </a:xfrm>
+      </p:grpSpPr>
+      <p:sp>
+        <p:nvSpPr>
+          <p:cNvPr id="2" name="Espace réservé de l'image des diapositives 1"/>
+          <p:cNvSpPr>
+            <a:spLocks noGrp="1" noRot="1" noChangeAspect="1"/>
+          </p:cNvSpPr>
+          <p:nvPr>
+            <p:ph type="sldImg"/>
+          </p:nvPr>
+        </p:nvSpPr>
+        <p:spPr/>
+      </p:sp>
+      <p:sp>
+        <p:nvSpPr>
+          <p:cNvPr id="3" name="Espace réservé des notes 2"/>
+          <p:cNvSpPr>
+            <a:spLocks noGrp="1"/>
+          </p:cNvSpPr>
+          <p:nvPr>
+            <p:ph type="body" idx="1"/>
+          </p:nvPr>
+        </p:nvSpPr>
+        <p:spPr/>
+        <p:txBody>
+          <a:bodyPr/>
+          <a:lstStyle/>
+          <a:p>
+            <a:r>
+              <a:rPr lang="fr-FR" dirty="0"/>
+              <a:t>Et bonjour,</a:t>
+            </a:r>
+          </a:p>
+          <a:p>
+            <a:endParaRPr lang="fr-FR" dirty="0"/>
+          </a:p>
+          <a:p>
+            <a:r>
+              <a:rPr lang="fr-FR" dirty="0"/>
+              <a:t>Bienvenue dans cet exercice POO consacré à la programmation orientée objet.</a:t>
+            </a:r>
+          </a:p>
+          <a:p>
+            <a:r>
+              <a:rPr lang="fr-FR" dirty="0"/>
+              <a:t>L'idée de cet exercice est d'implémenter quelques classes et de se familiariser avec la syntaxe objet du langage C#.</a:t>
+            </a:r>
+          </a:p>
+          <a:p>
+            <a:endParaRPr lang="fr-FR" dirty="0"/>
+          </a:p>
+          <a:p>
+            <a:r>
+              <a:rPr lang="fr-FR" dirty="0"/>
+              <a:t>Je vous présente une </a:t>
+            </a:r>
+            <a:r>
+              <a:rPr lang="fr-FR" dirty="0" err="1"/>
+              <a:t>hiéarchie</a:t>
+            </a:r>
+            <a:r>
+              <a:rPr lang="fr-FR" dirty="0"/>
+              <a:t> de classe à 3 niveaux concernant les véhicules.</a:t>
+            </a:r>
+          </a:p>
+          <a:p>
+            <a:r>
+              <a:rPr lang="fr-FR" dirty="0"/>
+              <a:t>Avec comme classe de base </a:t>
+            </a:r>
+            <a:r>
+              <a:rPr lang="fr-FR" dirty="0" err="1"/>
+              <a:t>VehiculeAMoteur</a:t>
+            </a:r>
+            <a:r>
+              <a:rPr lang="fr-FR" dirty="0"/>
+              <a:t>...</a:t>
+            </a:r>
+          </a:p>
+          <a:p>
+            <a:endParaRPr lang="fr-FR" dirty="0"/>
+          </a:p>
+          <a:p>
+            <a:r>
+              <a:rPr lang="fr-FR" dirty="0"/>
+              <a:t>Nous nous limiterons cependant dans cet exercice à implémenter les 5 classes suivantes.</a:t>
+            </a:r>
+          </a:p>
+          <a:p>
+            <a:r>
+              <a:rPr lang="fr-FR" dirty="0"/>
+              <a:t>La classe </a:t>
+            </a:r>
+            <a:r>
+              <a:rPr lang="fr-FR" dirty="0" err="1"/>
+              <a:t>VehiculeRoulant</a:t>
+            </a:r>
+            <a:r>
+              <a:rPr lang="fr-FR" dirty="0"/>
+              <a:t> sera une classe abstraite et contiendra une méthode abstraite.</a:t>
+            </a:r>
+          </a:p>
+          <a:p>
+            <a:r>
+              <a:rPr lang="fr-FR" dirty="0"/>
+              <a:t>Voici les propriétés (avec les valeurs par défaut) que vous devrez </a:t>
+            </a:r>
+            <a:r>
+              <a:rPr lang="fr-FR" dirty="0" err="1"/>
+              <a:t>implémnter</a:t>
+            </a:r>
+            <a:r>
+              <a:rPr lang="fr-FR" dirty="0"/>
+              <a:t> dans chaque classe.</a:t>
+            </a:r>
+          </a:p>
+          <a:p>
+            <a:r>
+              <a:rPr lang="fr-FR" dirty="0"/>
+              <a:t>Petit cas particulier, la classe Camion </a:t>
+            </a:r>
+            <a:r>
+              <a:rPr lang="fr-FR" dirty="0" err="1"/>
+              <a:t>definira</a:t>
+            </a:r>
+            <a:r>
+              <a:rPr lang="fr-FR" dirty="0"/>
+              <a:t> comme valeur par défaut </a:t>
+            </a:r>
+            <a:r>
+              <a:rPr lang="fr-FR" dirty="0" err="1"/>
+              <a:t>VitesseMaxi</a:t>
+            </a:r>
+            <a:r>
+              <a:rPr lang="fr-FR" dirty="0"/>
+              <a:t> à 110.</a:t>
+            </a:r>
+          </a:p>
+          <a:p>
+            <a:endParaRPr lang="fr-FR" dirty="0"/>
+          </a:p>
+          <a:p>
+            <a:r>
+              <a:rPr lang="fr-FR" dirty="0"/>
+              <a:t>Coté constructeur...</a:t>
+            </a:r>
+          </a:p>
+          <a:p>
+            <a:endParaRPr lang="fr-FR" dirty="0"/>
+          </a:p>
+          <a:p>
+            <a:r>
+              <a:rPr lang="fr-FR" dirty="0"/>
+              <a:t>Et enfin pour illustrer le polymorphisme la méthode abstraite de la classe </a:t>
+            </a:r>
+            <a:r>
+              <a:rPr lang="fr-FR" dirty="0" err="1"/>
+              <a:t>VehiculeRoulant</a:t>
+            </a:r>
+            <a:r>
+              <a:rPr lang="fr-FR" dirty="0"/>
+              <a:t> sera la méthode Consommation qui aura des formules de calcul différentes suivant si c'est un Camion, une Voiture et une Moto.</a:t>
+            </a:r>
+          </a:p>
+          <a:p>
+            <a:r>
+              <a:rPr lang="fr-FR" dirty="0"/>
+              <a:t>En effet, le calcul de la consommation pour une moto sera fonction de la distance, alors que pour le camion et la voiture, d'autres </a:t>
+            </a:r>
+            <a:r>
+              <a:rPr lang="fr-FR" dirty="0" err="1"/>
+              <a:t>parametres</a:t>
+            </a:r>
+            <a:r>
+              <a:rPr lang="fr-FR" dirty="0"/>
+              <a:t> rentrent en ligne de compte, comme la charge pour le Camion, et le nb de passagers pour la voiture.</a:t>
+            </a:r>
+          </a:p>
+          <a:p>
+            <a:endParaRPr lang="fr-FR" dirty="0"/>
+          </a:p>
+          <a:p>
+            <a:r>
+              <a:rPr lang="fr-FR" dirty="0"/>
+              <a:t>A noter aussi que nous ferons un exemple avec la propriété Distance qui devra toujours être comprise entre 0 et 2000.</a:t>
+            </a:r>
+          </a:p>
+          <a:p>
+            <a:endParaRPr lang="fr-FR" dirty="0"/>
+          </a:p>
+          <a:p>
+            <a:r>
+              <a:rPr lang="fr-FR" dirty="0"/>
+              <a:t>L'implémentation de ces différentes classes va vous permettre de faire fonctionner cette petite application qui simule une petite calculatrice de consommation.</a:t>
+            </a:r>
+          </a:p>
+          <a:p>
+            <a:r>
+              <a:rPr lang="fr-FR" dirty="0"/>
+              <a:t>Pour vous aider dans cet exercices, vous trouverez des TODO qui seront autant d'étapes à franchir, et des tests unitaires qui vous permettrons de vérifier la correcte implémentation que vous ferez de cet exercice.</a:t>
+            </a:r>
+          </a:p>
+          <a:p>
+            <a:endParaRPr lang="fr-FR" dirty="0"/>
+          </a:p>
+          <a:p>
+            <a:r>
+              <a:rPr lang="fr-FR" dirty="0"/>
+              <a:t>Alors je vous souhaite une bonne route et de consommer avec modération cet exercice</a:t>
+            </a:r>
+          </a:p>
+          <a:p>
+            <a:endParaRPr lang="fr-FR" dirty="0"/>
+          </a:p>
+          <a:p>
+            <a:r>
+              <a:rPr lang="fr-FR" dirty="0"/>
+              <a:t>A bientôt</a:t>
+            </a:r>
+          </a:p>
+        </p:txBody>
+      </p:sp>
+      <p:sp>
+        <p:nvSpPr>
+          <p:cNvPr id="4" name="Espace réservé du numéro de diapositive 3"/>
+          <p:cNvSpPr>
+            <a:spLocks noGrp="1"/>
+          </p:cNvSpPr>
+          <p:nvPr>
+            <p:ph type="sldNum" sz="quarter" idx="5"/>
+          </p:nvPr>
+        </p:nvSpPr>
+        <p:spPr/>
+        <p:txBody>
+          <a:bodyPr/>
+          <a:lstStyle/>
+          <a:p>
+            <a:fld id="{9F7A9348-820D-47CC-9D56-5DCCBE925326}" type="slidenum">
+              <a:rPr lang="en-US" altLang="fr-FR" smtClean="0"/>
+              <a:pPr/>
+              <a:t>4</a:t>
+            </a:fld>
+            <a:endParaRPr lang="en-US" altLang="fr-FR"/>
+          </a:p>
+        </p:txBody>
+      </p:sp>
+    </p:spTree>
+    <p:extLst>
+      <p:ext uri="{BB962C8B-B14F-4D97-AF65-F5344CB8AC3E}">
+        <p14:creationId xmlns:p14="http://schemas.microsoft.com/office/powerpoint/2010/main" val="864581242"/>
+      </p:ext>
+    </p:extLst>
+  </p:cSld>
+  <p:clrMapOvr>
+    <a:masterClrMapping/>
+  </p:clrMapOvr>
+</p:notes>
+</file>
+
 <file path=ppt/slideLayouts/slideLayout1.xml><?xml version="1.0" encoding="utf-8"?>
 <p:sldLayout xmlns:a="http://schemas.openxmlformats.org/drawingml/2006/main" xmlns:r="http://schemas.openxmlformats.org/officeDocument/2006/relationships" xmlns:p="http://schemas.openxmlformats.org/presentationml/2006/main" showMasterSp="0" type="title" preserve="1">
   <p:cSld name="Diapositive de titre">
@@ -3806,7 +4081,7 @@
           <a:graphicData uri="http://schemas.openxmlformats.org/presentationml/2006/ole">
             <mc:AlternateContent xmlns:mc="http://schemas.openxmlformats.org/markup-compatibility/2006">
               <mc:Choice xmlns:v="urn:schemas-microsoft-com:vml" Requires="v">
-                <p:oleObj spid="_x0000_s1032" name="Image Bitmap" r:id="rId15" imgW="2828571" imgH="990738" progId="Paint.Picture">
+                <p:oleObj spid="_x0000_s1035" name="Image Bitmap" r:id="rId15" imgW="2828571" imgH="990738" progId="Paint.Picture">
                   <p:embed/>
                 </p:oleObj>
               </mc:Choice>
@@ -8251,7 +8526,7 @@
           <p:nvPr/>
         </p:nvPicPr>
         <p:blipFill>
-          <a:blip r:embed="rId2">
+          <a:blip r:embed="rId3">
             <a:extLst>
               <a:ext uri="{28A0092B-C50C-407E-A947-70E740481C1C}">
                 <a14:useLocalDpi xmlns:a14="http://schemas.microsoft.com/office/drawing/2010/main" val="0"/>

</xml_diff>